<commit_message>
Versao final slide. Fabio
</commit_message>
<xml_diff>
--- a/TF-IPI.pptx
+++ b/TF-IPI.pptx
@@ -32,6 +32,7 @@
     <p:sldId id="282" r:id="rId26"/>
     <p:sldId id="283" r:id="rId27"/>
     <p:sldId id="284" r:id="rId28"/>
+    <p:sldId id="285" r:id="rId29"/>
   </p:sldIdLst>
   <p:sldSz cx="9144000" cy="6858000" type="screen4x3"/>
   <p:notesSz cx="6858000" cy="9144000"/>
@@ -3673,6 +3674,13 @@
   <p:clrMapOvr>
     <a:masterClrMapping/>
   </p:clrMapOvr>
+  <p:timing>
+    <p:tnLst>
+      <p:par>
+        <p:cTn id="1" dur="indefinite" restart="never" nodeType="tmRoot"/>
+      </p:par>
+    </p:tnLst>
+  </p:timing>
 </p:sld>
 </file>
 
@@ -3747,6 +3755,13 @@
   <p:clrMapOvr>
     <a:masterClrMapping/>
   </p:clrMapOvr>
+  <p:timing>
+    <p:tnLst>
+      <p:par>
+        <p:cTn id="1" dur="indefinite" restart="never" nodeType="tmRoot"/>
+      </p:par>
+    </p:tnLst>
+  </p:timing>
 </p:sld>
 </file>
 
@@ -3825,6 +3840,13 @@
   <p:clrMapOvr>
     <a:masterClrMapping/>
   </p:clrMapOvr>
+  <p:timing>
+    <p:tnLst>
+      <p:par>
+        <p:cTn id="1" dur="indefinite" restart="never" nodeType="tmRoot"/>
+      </p:par>
+    </p:tnLst>
+  </p:timing>
 </p:sld>
 </file>
 
@@ -3899,6 +3921,13 @@
   <p:clrMapOvr>
     <a:masterClrMapping/>
   </p:clrMapOvr>
+  <p:timing>
+    <p:tnLst>
+      <p:par>
+        <p:cTn id="1" dur="indefinite" restart="never" nodeType="tmRoot"/>
+      </p:par>
+    </p:tnLst>
+  </p:timing>
 </p:sld>
 </file>
 
@@ -3977,6 +4006,13 @@
   <p:clrMapOvr>
     <a:masterClrMapping/>
   </p:clrMapOvr>
+  <p:timing>
+    <p:tnLst>
+      <p:par>
+        <p:cTn id="1" dur="indefinite" restart="never" nodeType="tmRoot"/>
+      </p:par>
+    </p:tnLst>
+  </p:timing>
 </p:sld>
 </file>
 
@@ -4051,6 +4087,13 @@
   <p:clrMapOvr>
     <a:masterClrMapping/>
   </p:clrMapOvr>
+  <p:timing>
+    <p:tnLst>
+      <p:par>
+        <p:cTn id="1" dur="indefinite" restart="never" nodeType="tmRoot"/>
+      </p:par>
+    </p:tnLst>
+  </p:timing>
 </p:sld>
 </file>
 
@@ -4129,6 +4172,13 @@
   <p:clrMapOvr>
     <a:masterClrMapping/>
   </p:clrMapOvr>
+  <p:timing>
+    <p:tnLst>
+      <p:par>
+        <p:cTn id="1" dur="indefinite" restart="never" nodeType="tmRoot"/>
+      </p:par>
+    </p:tnLst>
+  </p:timing>
 </p:sld>
 </file>
 
@@ -4203,6 +4253,13 @@
   <p:clrMapOvr>
     <a:masterClrMapping/>
   </p:clrMapOvr>
+  <p:timing>
+    <p:tnLst>
+      <p:par>
+        <p:cTn id="1" dur="indefinite" restart="never" nodeType="tmRoot"/>
+      </p:par>
+    </p:tnLst>
+  </p:timing>
 </p:sld>
 </file>
 
@@ -4281,6 +4338,13 @@
   <p:clrMapOvr>
     <a:masterClrMapping/>
   </p:clrMapOvr>
+  <p:timing>
+    <p:tnLst>
+      <p:par>
+        <p:cTn id="1" dur="indefinite" restart="never" nodeType="tmRoot"/>
+      </p:par>
+    </p:tnLst>
+  </p:timing>
 </p:sld>
 </file>
 
@@ -4355,6 +4419,13 @@
   <p:clrMapOvr>
     <a:masterClrMapping/>
   </p:clrMapOvr>
+  <p:timing>
+    <p:tnLst>
+      <p:par>
+        <p:cTn id="1" dur="indefinite" restart="never" nodeType="tmRoot"/>
+      </p:par>
+    </p:tnLst>
+  </p:timing>
 </p:sld>
 </file>
 
@@ -4433,6 +4504,13 @@
   <p:clrMapOvr>
     <a:masterClrMapping/>
   </p:clrMapOvr>
+  <p:timing>
+    <p:tnLst>
+      <p:par>
+        <p:cTn id="1" dur="indefinite" restart="never" nodeType="tmRoot"/>
+      </p:par>
+    </p:tnLst>
+  </p:timing>
 </p:sld>
 </file>
 
@@ -4521,6 +4599,13 @@
   <p:clrMapOvr>
     <a:masterClrMapping/>
   </p:clrMapOvr>
+  <p:timing>
+    <p:tnLst>
+      <p:par>
+        <p:cTn id="1" dur="indefinite" restart="never" nodeType="tmRoot"/>
+      </p:par>
+    </p:tnLst>
+  </p:timing>
 </p:sld>
 </file>
 
@@ -4595,6 +4680,13 @@
   <p:clrMapOvr>
     <a:masterClrMapping/>
   </p:clrMapOvr>
+  <p:timing>
+    <p:tnLst>
+      <p:par>
+        <p:cTn id="1" dur="indefinite" restart="never" nodeType="tmRoot"/>
+      </p:par>
+    </p:tnLst>
+  </p:timing>
 </p:sld>
 </file>
 
@@ -4673,6 +4765,13 @@
   <p:clrMapOvr>
     <a:masterClrMapping/>
   </p:clrMapOvr>
+  <p:timing>
+    <p:tnLst>
+      <p:par>
+        <p:cTn id="1" dur="indefinite" restart="never" nodeType="tmRoot"/>
+      </p:par>
+    </p:tnLst>
+  </p:timing>
 </p:sld>
 </file>
 
@@ -4747,6 +4846,13 @@
   <p:clrMapOvr>
     <a:masterClrMapping/>
   </p:clrMapOvr>
+  <p:timing>
+    <p:tnLst>
+      <p:par>
+        <p:cTn id="1" dur="indefinite" restart="never" nodeType="tmRoot"/>
+      </p:par>
+    </p:tnLst>
+  </p:timing>
 </p:sld>
 </file>
 
@@ -4825,6 +4931,13 @@
   <p:clrMapOvr>
     <a:masterClrMapping/>
   </p:clrMapOvr>
+  <p:timing>
+    <p:tnLst>
+      <p:par>
+        <p:cTn id="1" dur="indefinite" restart="never" nodeType="tmRoot"/>
+      </p:par>
+    </p:tnLst>
+  </p:timing>
 </p:sld>
 </file>
 
@@ -4904,6 +5017,13 @@
   <p:clrMapOvr>
     <a:masterClrMapping/>
   </p:clrMapOvr>
+  <p:timing>
+    <p:tnLst>
+      <p:par>
+        <p:cTn id="1" dur="indefinite" restart="never" nodeType="tmRoot"/>
+      </p:par>
+    </p:tnLst>
+  </p:timing>
 </p:sld>
 </file>
 
@@ -4987,6 +5107,13 @@
   <p:clrMapOvr>
     <a:masterClrMapping/>
   </p:clrMapOvr>
+  <p:timing>
+    <p:tnLst>
+      <p:par>
+        <p:cTn id="1" dur="indefinite" restart="never" nodeType="tmRoot"/>
+      </p:par>
+    </p:tnLst>
+  </p:timing>
 </p:sld>
 </file>
 
@@ -5061,6 +5188,13 @@
   <p:clrMapOvr>
     <a:masterClrMapping/>
   </p:clrMapOvr>
+  <p:timing>
+    <p:tnLst>
+      <p:par>
+        <p:cTn id="1" dur="indefinite" restart="never" nodeType="tmRoot"/>
+      </p:par>
+    </p:tnLst>
+  </p:timing>
 </p:sld>
 </file>
 
@@ -5102,11 +5236,7 @@
             </a:r>
             <a:r>
               <a:rPr lang="pt-BR" dirty="0" smtClean="0"/>
-              <a:t> </a:t>
-            </a:r>
-            <a:r>
-              <a:rPr lang="pt-BR" dirty="0" smtClean="0"/>
-              <a:t>- 11</a:t>
+              <a:t> - 11</a:t>
             </a:r>
             <a:endParaRPr lang="pt-BR" dirty="0"/>
           </a:p>
@@ -5131,6 +5261,93 @@
           <a:xfrm>
             <a:off x="0" y="1556792"/>
             <a:ext cx="9144000" cy="5143500"/>
+          </a:xfrm>
+          <a:prstGeom prst="rect">
+            <a:avLst/>
+          </a:prstGeom>
+          <a:noFill/>
+        </p:spPr>
+      </p:pic>
+    </p:spTree>
+  </p:cSld>
+  <p:clrMapOvr>
+    <a:masterClrMapping/>
+  </p:clrMapOvr>
+  <p:timing>
+    <p:tnLst>
+      <p:par>
+        <p:cTn id="1" dur="indefinite" restart="never" nodeType="tmRoot"/>
+      </p:par>
+    </p:tnLst>
+  </p:timing>
+</p:sld>
+</file>
+
+<file path=ppt/slides/slide28.xml><?xml version="1.0" encoding="utf-8"?>
+<p:sld xmlns:a="http://schemas.openxmlformats.org/drawingml/2006/main" xmlns:r="http://schemas.openxmlformats.org/officeDocument/2006/relationships" xmlns:p="http://schemas.openxmlformats.org/presentationml/2006/main">
+  <p:cSld>
+    <p:spTree>
+      <p:nvGrpSpPr>
+        <p:cNvPr id="1" name=""/>
+        <p:cNvGrpSpPr/>
+        <p:nvPr/>
+      </p:nvGrpSpPr>
+      <p:grpSpPr>
+        <a:xfrm>
+          <a:off x="0" y="0"/>
+          <a:ext cx="0" cy="0"/>
+          <a:chOff x="0" y="0"/>
+          <a:chExt cx="0" cy="0"/>
+        </a:xfrm>
+      </p:grpSpPr>
+      <p:sp>
+        <p:nvSpPr>
+          <p:cNvPr id="2" name="Título 1"/>
+          <p:cNvSpPr>
+            <a:spLocks noGrp="1"/>
+          </p:cNvSpPr>
+          <p:nvPr>
+            <p:ph type="title"/>
+          </p:nvPr>
+        </p:nvSpPr>
+        <p:spPr>
+          <a:xfrm>
+            <a:off x="251520" y="0"/>
+            <a:ext cx="8229600" cy="1399032"/>
+          </a:xfrm>
+        </p:spPr>
+        <p:txBody>
+          <a:bodyPr/>
+          <a:lstStyle/>
+          <a:p>
+            <a:pPr algn="ctr"/>
+            <a:r>
+              <a:rPr lang="pt-BR" dirty="0" smtClean="0"/>
+              <a:t>Dúvidas?</a:t>
+            </a:r>
+            <a:endParaRPr lang="pt-BR" dirty="0"/>
+          </a:p>
+        </p:txBody>
+      </p:sp>
+      <p:pic>
+        <p:nvPicPr>
+          <p:cNvPr id="2050" name="Picture 2" descr="C:\Users\MCC\Documents\GitHub\Trabalho-IPI\Imagens\duvida_final.png"/>
+          <p:cNvPicPr>
+            <a:picLocks noChangeAspect="1" noChangeArrowheads="1"/>
+          </p:cNvPicPr>
+          <p:nvPr/>
+        </p:nvPicPr>
+        <p:blipFill>
+          <a:blip r:embed="rId2" cstate="print"/>
+          <a:srcRect/>
+          <a:stretch>
+            <a:fillRect/>
+          </a:stretch>
+        </p:blipFill>
+        <p:spPr bwMode="auto">
+          <a:xfrm>
+            <a:off x="2843808" y="1196752"/>
+            <a:ext cx="3528392" cy="5160353"/>
           </a:xfrm>
           <a:prstGeom prst="rect">
             <a:avLst/>
@@ -5229,6 +5446,13 @@
   <p:clrMapOvr>
     <a:masterClrMapping/>
   </p:clrMapOvr>
+  <p:timing>
+    <p:tnLst>
+      <p:par>
+        <p:cTn id="1" dur="indefinite" restart="never" nodeType="tmRoot"/>
+      </p:par>
+    </p:tnLst>
+  </p:timing>
 </p:sld>
 </file>
 
@@ -5329,6 +5553,13 @@
   <p:clrMapOvr>
     <a:masterClrMapping/>
   </p:clrMapOvr>
+  <p:timing>
+    <p:tnLst>
+      <p:par>
+        <p:cTn id="1" dur="indefinite" restart="never" nodeType="tmRoot"/>
+      </p:par>
+    </p:tnLst>
+  </p:timing>
 </p:sld>
 </file>
 
@@ -5426,6 +5657,13 @@
   <p:clrMapOvr>
     <a:masterClrMapping/>
   </p:clrMapOvr>
+  <p:timing>
+    <p:tnLst>
+      <p:par>
+        <p:cTn id="1" dur="indefinite" restart="never" nodeType="tmRoot"/>
+      </p:par>
+    </p:tnLst>
+  </p:timing>
 </p:sld>
 </file>
 
@@ -5505,6 +5743,13 @@
   <p:clrMapOvr>
     <a:masterClrMapping/>
   </p:clrMapOvr>
+  <p:timing>
+    <p:tnLst>
+      <p:par>
+        <p:cTn id="1" dur="indefinite" restart="never" nodeType="tmRoot"/>
+      </p:par>
+    </p:tnLst>
+  </p:timing>
 </p:sld>
 </file>
 
@@ -5583,6 +5828,13 @@
   <p:clrMapOvr>
     <a:masterClrMapping/>
   </p:clrMapOvr>
+  <p:timing>
+    <p:tnLst>
+      <p:par>
+        <p:cTn id="1" dur="indefinite" restart="never" nodeType="tmRoot"/>
+      </p:par>
+    </p:tnLst>
+  </p:timing>
 </p:sld>
 </file>
 
@@ -5657,6 +5909,13 @@
   <p:clrMapOvr>
     <a:masterClrMapping/>
   </p:clrMapOvr>
+  <p:timing>
+    <p:tnLst>
+      <p:par>
+        <p:cTn id="1" dur="indefinite" restart="never" nodeType="tmRoot"/>
+      </p:par>
+    </p:tnLst>
+  </p:timing>
 </p:sld>
 </file>
 
@@ -5735,6 +5994,13 @@
   <p:clrMapOvr>
     <a:masterClrMapping/>
   </p:clrMapOvr>
+  <p:timing>
+    <p:tnLst>
+      <p:par>
+        <p:cTn id="1" dur="indefinite" restart="never" nodeType="tmRoot"/>
+      </p:par>
+    </p:tnLst>
+  </p:timing>
 </p:sld>
 </file>
 

</xml_diff>